<commit_message>
fixed typo in midterm review
</commit_message>
<xml_diff>
--- a/Comp208/COMP 208 Midterm Review.pptx
+++ b/Comp208/COMP 208 Midterm Review.pptx
@@ -230,7 +230,7 @@
           <a:p>
             <a:fld id="{E11AD3FF-1828-46F6-A9E2-9B2A9D004582}" type="datetimeFigureOut">
               <a:rPr lang="en-CA" smtClean="0"/>
-              <a:t>2014-10-12</a:t>
+              <a:t>2014-10-15</a:t>
             </a:fld>
             <a:endParaRPr lang="en-CA"/>
           </a:p>
@@ -1034,7 +1034,7 @@
             <a:fld id="{5586B75A-687E-405C-8A0B-8D00578BA2C3}" type="datetimeFigureOut">
               <a:rPr lang="en-US" dirty="0"/>
               <a:pPr/>
-              <a:t>10/12/2014</a:t>
+              <a:t>10/15/2014</a:t>
             </a:fld>
             <a:endParaRPr lang="en-US" dirty="0"/>
           </a:p>
@@ -1220,7 +1220,7 @@
           <a:p>
             <a:fld id="{5F4E5243-F52A-4D37-9694-EB26C6C31910}" type="datetimeFigureOut">
               <a:rPr lang="en-US" dirty="0"/>
-              <a:t>10/12/2014</a:t>
+              <a:t>10/15/2014</a:t>
             </a:fld>
             <a:endParaRPr lang="en-US" dirty="0"/>
           </a:p>
@@ -1395,7 +1395,7 @@
           <a:p>
             <a:fld id="{3A77B6E1-634A-48DC-9E8B-D894023267EF}" type="datetimeFigureOut">
               <a:rPr lang="en-US" dirty="0"/>
-              <a:t>10/12/2014</a:t>
+              <a:t>10/15/2014</a:t>
             </a:fld>
             <a:endParaRPr lang="en-US" dirty="0"/>
           </a:p>
@@ -1560,7 +1560,7 @@
           <a:p>
             <a:fld id="{7B2D3E9E-A95C-48F2-B4BF-A71542E0BE9A}" type="datetimeFigureOut">
               <a:rPr lang="en-US" dirty="0"/>
-              <a:t>10/12/2014</a:t>
+              <a:t>10/15/2014</a:t>
             </a:fld>
             <a:endParaRPr lang="en-US" dirty="0"/>
           </a:p>
@@ -1812,7 +1812,7 @@
             <a:fld id="{5586B75A-687E-405C-8A0B-8D00578BA2C3}" type="datetimeFigureOut">
               <a:rPr lang="en-US" dirty="0"/>
               <a:pPr/>
-              <a:t>10/12/2014</a:t>
+              <a:t>10/15/2014</a:t>
             </a:fld>
             <a:endParaRPr lang="en-US" dirty="0"/>
           </a:p>
@@ -2096,7 +2096,7 @@
           <a:p>
             <a:fld id="{F12952B5-7A2F-4CC8-B7CE-9234E21C2837}" type="datetimeFigureOut">
               <a:rPr lang="en-US" dirty="0"/>
-              <a:t>10/12/2014</a:t>
+              <a:t>10/15/2014</a:t>
             </a:fld>
             <a:endParaRPr lang="en-US" dirty="0"/>
           </a:p>
@@ -2529,7 +2529,7 @@
           <a:p>
             <a:fld id="{CE1DA07A-9201-4B4B-BAF2-015AFA30F520}" type="datetimeFigureOut">
               <a:rPr lang="en-US" dirty="0"/>
-              <a:t>10/12/2014</a:t>
+              <a:t>10/15/2014</a:t>
             </a:fld>
             <a:endParaRPr lang="en-US" dirty="0"/>
           </a:p>
@@ -2642,7 +2642,7 @@
           <a:p>
             <a:fld id="{73D7E00A-486F-4252-8B1D-E32645521F49}" type="datetimeFigureOut">
               <a:rPr lang="en-US" dirty="0"/>
-              <a:t>10/12/2014</a:t>
+              <a:t>10/15/2014</a:t>
             </a:fld>
             <a:endParaRPr lang="en-US" dirty="0"/>
           </a:p>
@@ -2732,7 +2732,7 @@
           <a:p>
             <a:fld id="{8DDF5F92-E675-4B36-9A60-69A962A68675}" type="datetimeFigureOut">
               <a:rPr lang="en-US" dirty="0"/>
-              <a:t>10/12/2014</a:t>
+              <a:t>10/15/2014</a:t>
             </a:fld>
             <a:endParaRPr lang="en-US" dirty="0"/>
           </a:p>
@@ -3083,7 +3083,7 @@
           <a:p>
             <a:fld id="{AF6E2C9B-5FA2-460D-9BE7-B0812FC2A6FF}" type="datetimeFigureOut">
               <a:rPr lang="en-US" dirty="0"/>
-              <a:t>10/12/2014</a:t>
+              <a:t>10/15/2014</a:t>
             </a:fld>
             <a:endParaRPr lang="en-US" dirty="0"/>
           </a:p>
@@ -3396,7 +3396,7 @@
             <a:fld id="{5586B75A-687E-405C-8A0B-8D00578BA2C3}" type="datetimeFigureOut">
               <a:rPr lang="en-US" dirty="0"/>
               <a:pPr/>
-              <a:t>10/12/2014</a:t>
+              <a:t>10/15/2014</a:t>
             </a:fld>
             <a:endParaRPr lang="en-US" dirty="0"/>
           </a:p>
@@ -3626,7 +3626,7 @@
             <a:fld id="{5586B75A-687E-405C-8A0B-8D00578BA2C3}" type="datetimeFigureOut">
               <a:rPr lang="en-US" dirty="0"/>
               <a:pPr/>
-              <a:t>10/12/2014</a:t>
+              <a:t>10/15/2014</a:t>
             </a:fld>
             <a:endParaRPr lang="en-US" dirty="0"/>
           </a:p>
@@ -6375,8 +6375,27 @@
           <a:p>
             <a:r>
               <a:rPr lang="en-CA" dirty="0" smtClean="0"/>
-              <a:t>Engineering Peer tutor for Computer Science</a:t>
-            </a:r>
+              <a:t>Engineering Peer tutor for Computer </a:t>
+            </a:r>
+            <a:r>
+              <a:rPr lang="en-CA" dirty="0" smtClean="0"/>
+              <a:t>Science</a:t>
+            </a:r>
+          </a:p>
+          <a:p>
+            <a:r>
+              <a:rPr lang="en-US" b="1" dirty="0" smtClean="0">
+                <a:solidFill>
+                  <a:srgbClr val="FF0000"/>
+                </a:solidFill>
+              </a:rPr>
+              <a:t>Office hours Thursdays from 16:00 – 17:30 at FDA 6B</a:t>
+            </a:r>
+            <a:endParaRPr lang="en-CA" b="1" dirty="0" smtClean="0">
+              <a:solidFill>
+                <a:srgbClr val="FF0000"/>
+              </a:solidFill>
+            </a:endParaRPr>
           </a:p>
           <a:p>
             <a:r>
@@ -8633,7 +8652,7 @@
       </p:sp>
       <p:pic>
         <p:nvPicPr>
-          <p:cNvPr id="3" name="Picture 2"/>
+          <p:cNvPr id="4" name="Picture 3"/>
           <p:cNvPicPr>
             <a:picLocks noChangeAspect="1"/>
           </p:cNvPicPr>
@@ -8647,8 +8666,8 @@
         </p:blipFill>
         <p:spPr>
           <a:xfrm>
-            <a:off x="3873917" y="2011680"/>
-            <a:ext cx="5286375" cy="4591050"/>
+            <a:off x="3739955" y="2011680"/>
+            <a:ext cx="4505559" cy="3766185"/>
           </a:xfrm>
           <a:prstGeom prst="rect">
             <a:avLst/>
@@ -9028,11 +9047,7 @@
             </a:r>
             <a:r>
               <a:rPr lang="en-CA" dirty="0" smtClean="0"/>
-              <a:t>:  &amp;</a:t>
-            </a:r>
-            <a:r>
-              <a:rPr lang="en-CA" dirty="0" smtClean="0"/>
-              <a:t>x aka value</a:t>
+              <a:t>:  &amp;x aka value</a:t>
             </a:r>
             <a:endParaRPr lang="en-CA" dirty="0"/>
           </a:p>
@@ -9185,9 +9200,54 @@
           </a:p>
         </p:txBody>
       </p:sp>
+      <p:sp>
+        <p:nvSpPr>
+          <p:cNvPr id="4" name="Rectangle 3"/>
+          <p:cNvSpPr/>
+          <p:nvPr/>
+        </p:nvSpPr>
+        <p:spPr>
+          <a:xfrm>
+            <a:off x="696849" y="3984039"/>
+            <a:ext cx="1813958" cy="646331"/>
+          </a:xfrm>
+          <a:prstGeom prst="rect">
+            <a:avLst/>
+          </a:prstGeom>
+        </p:spPr>
+        <p:txBody>
+          <a:bodyPr wrap="none">
+            <a:spAutoFit/>
+          </a:bodyPr>
+          <a:lstStyle/>
+          <a:p>
+            <a:r>
+              <a:rPr lang="en-CA" sz="3600" dirty="0">
+                <a:solidFill>
+                  <a:srgbClr val="FFC000"/>
+                </a:solidFill>
+              </a:rPr>
+              <a:t>Prints </a:t>
+            </a:r>
+            <a:r>
+              <a:rPr lang="en-CA" sz="3600" dirty="0" smtClean="0">
+                <a:solidFill>
+                  <a:srgbClr val="FFC000"/>
+                </a:solidFill>
+              </a:rPr>
+              <a:t>11</a:t>
+            </a:r>
+            <a:endParaRPr lang="en-CA" sz="3600" dirty="0">
+              <a:solidFill>
+                <a:srgbClr val="FFC000"/>
+              </a:solidFill>
+            </a:endParaRPr>
+          </a:p>
+        </p:txBody>
+      </p:sp>
       <p:pic>
         <p:nvPicPr>
-          <p:cNvPr id="3" name="Picture 2"/>
+          <p:cNvPr id="5" name="Picture 4"/>
           <p:cNvPicPr>
             <a:picLocks noChangeAspect="1"/>
           </p:cNvPicPr>
@@ -9201,59 +9261,14 @@
         </p:blipFill>
         <p:spPr>
           <a:xfrm>
-            <a:off x="3873917" y="2011680"/>
-            <a:ext cx="5286375" cy="4591050"/>
+            <a:off x="4196749" y="1988554"/>
+            <a:ext cx="5547690" cy="4637300"/>
           </a:xfrm>
           <a:prstGeom prst="rect">
             <a:avLst/>
           </a:prstGeom>
         </p:spPr>
       </p:pic>
-      <p:sp>
-        <p:nvSpPr>
-          <p:cNvPr id="4" name="Rectangle 3"/>
-          <p:cNvSpPr/>
-          <p:nvPr/>
-        </p:nvSpPr>
-        <p:spPr>
-          <a:xfrm>
-            <a:off x="696849" y="3984039"/>
-            <a:ext cx="1813958" cy="646331"/>
-          </a:xfrm>
-          <a:prstGeom prst="rect">
-            <a:avLst/>
-          </a:prstGeom>
-        </p:spPr>
-        <p:txBody>
-          <a:bodyPr wrap="none">
-            <a:spAutoFit/>
-          </a:bodyPr>
-          <a:lstStyle/>
-          <a:p>
-            <a:r>
-              <a:rPr lang="en-CA" sz="3600" dirty="0">
-                <a:solidFill>
-                  <a:srgbClr val="FFC000"/>
-                </a:solidFill>
-              </a:rPr>
-              <a:t>Prints </a:t>
-            </a:r>
-            <a:r>
-              <a:rPr lang="en-CA" sz="3600" dirty="0" smtClean="0">
-                <a:solidFill>
-                  <a:srgbClr val="FFC000"/>
-                </a:solidFill>
-              </a:rPr>
-              <a:t>11</a:t>
-            </a:r>
-            <a:endParaRPr lang="en-CA" sz="3600" dirty="0">
-              <a:solidFill>
-                <a:srgbClr val="FFC000"/>
-              </a:solidFill>
-            </a:endParaRPr>
-          </a:p>
-        </p:txBody>
-      </p:sp>
     </p:spTree>
     <p:extLst>
       <p:ext uri="{BB962C8B-B14F-4D97-AF65-F5344CB8AC3E}">

</xml_diff>